<commit_message>
reorganized code, finished ppt
</commit_message>
<xml_diff>
--- a/MonteCarloWorldCup2018.pptx
+++ b/MonteCarloWorldCup2018.pptx
@@ -9,9 +9,11 @@
     <p:sldId id="257" r:id="rId3"/>
     <p:sldId id="259" r:id="rId4"/>
     <p:sldId id="258" r:id="rId5"/>
-    <p:sldId id="260" r:id="rId6"/>
-    <p:sldId id="261" r:id="rId7"/>
-    <p:sldId id="262" r:id="rId8"/>
+    <p:sldId id="264" r:id="rId6"/>
+    <p:sldId id="260" r:id="rId7"/>
+    <p:sldId id="265" r:id="rId8"/>
+    <p:sldId id="261" r:id="rId9"/>
+    <p:sldId id="263" r:id="rId10"/>
   </p:sldIdLst>
   <p:sldSz cx="12192000" cy="6858000"/>
   <p:notesSz cx="6858000" cy="9144000"/>
@@ -110,6 +112,11 @@
       </a:defRPr>
     </a:lvl9pPr>
   </p:defaultTextStyle>
+  <p:extLst>
+    <p:ext uri="{EFAFB233-063F-42B5-8137-9DF3F51BA10A}">
+      <p15:sldGuideLst xmlns:p15="http://schemas.microsoft.com/office/powerpoint/2012/main"/>
+    </p:ext>
+  </p:extLst>
 </p:presentation>
 </file>
 
@@ -448,7 +455,7 @@
           <a:p>
             <a:fld id="{DA0418CF-9665-4435-A195-0B93DCBC678D}" type="datetimeFigureOut">
               <a:rPr lang="en-US" smtClean="0"/>
-              <a:t>5/23/2018</a:t>
+              <a:t>5/25/2018</a:t>
             </a:fld>
             <a:endParaRPr lang="en-US"/>
           </a:p>
@@ -1541,7 +1548,7 @@
           <a:p>
             <a:fld id="{DA0418CF-9665-4435-A195-0B93DCBC678D}" type="datetimeFigureOut">
               <a:rPr lang="en-US" smtClean="0"/>
-              <a:t>5/23/2018</a:t>
+              <a:t>5/25/2018</a:t>
             </a:fld>
             <a:endParaRPr lang="en-US"/>
           </a:p>
@@ -2521,7 +2528,7 @@
           <a:p>
             <a:fld id="{DA0418CF-9665-4435-A195-0B93DCBC678D}" type="datetimeFigureOut">
               <a:rPr lang="en-US" smtClean="0"/>
-              <a:t>5/23/2018</a:t>
+              <a:t>5/25/2018</a:t>
             </a:fld>
             <a:endParaRPr lang="en-US"/>
           </a:p>
@@ -3655,7 +3662,7 @@
           <a:p>
             <a:fld id="{DA0418CF-9665-4435-A195-0B93DCBC678D}" type="datetimeFigureOut">
               <a:rPr lang="en-US" smtClean="0"/>
-              <a:t>5/23/2018</a:t>
+              <a:t>5/25/2018</a:t>
             </a:fld>
             <a:endParaRPr lang="en-US"/>
           </a:p>
@@ -4688,7 +4695,7 @@
           <a:p>
             <a:fld id="{DA0418CF-9665-4435-A195-0B93DCBC678D}" type="datetimeFigureOut">
               <a:rPr lang="en-US" smtClean="0"/>
-              <a:t>5/23/2018</a:t>
+              <a:t>5/25/2018</a:t>
             </a:fld>
             <a:endParaRPr lang="en-US"/>
           </a:p>
@@ -5348,7 +5355,7 @@
           <a:p>
             <a:fld id="{DA0418CF-9665-4435-A195-0B93DCBC678D}" type="datetimeFigureOut">
               <a:rPr lang="en-US" smtClean="0"/>
-              <a:t>5/23/2018</a:t>
+              <a:t>5/25/2018</a:t>
             </a:fld>
             <a:endParaRPr lang="en-US"/>
           </a:p>
@@ -6209,7 +6216,7 @@
           <a:p>
             <a:fld id="{DA0418CF-9665-4435-A195-0B93DCBC678D}" type="datetimeFigureOut">
               <a:rPr lang="en-US" smtClean="0"/>
-              <a:t>5/23/2018</a:t>
+              <a:t>5/25/2018</a:t>
             </a:fld>
             <a:endParaRPr lang="en-US"/>
           </a:p>
@@ -6399,7 +6406,7 @@
           <a:p>
             <a:fld id="{DA0418CF-9665-4435-A195-0B93DCBC678D}" type="datetimeFigureOut">
               <a:rPr lang="en-US" smtClean="0"/>
-              <a:t>5/23/2018</a:t>
+              <a:t>5/25/2018</a:t>
             </a:fld>
             <a:endParaRPr lang="en-US"/>
           </a:p>
@@ -7371,7 +7378,7 @@
           <a:p>
             <a:fld id="{DA0418CF-9665-4435-A195-0B93DCBC678D}" type="datetimeFigureOut">
               <a:rPr lang="en-US" smtClean="0"/>
-              <a:t>5/23/2018</a:t>
+              <a:t>5/25/2018</a:t>
             </a:fld>
             <a:endParaRPr lang="en-US"/>
           </a:p>
@@ -7582,7 +7589,7 @@
           <a:p>
             <a:fld id="{DA0418CF-9665-4435-A195-0B93DCBC678D}" type="datetimeFigureOut">
               <a:rPr lang="en-US" smtClean="0"/>
-              <a:t>5/23/2018</a:t>
+              <a:t>5/25/2018</a:t>
             </a:fld>
             <a:endParaRPr lang="en-US"/>
           </a:p>
@@ -8616,7 +8623,7 @@
           <a:p>
             <a:fld id="{DA0418CF-9665-4435-A195-0B93DCBC678D}" type="datetimeFigureOut">
               <a:rPr lang="en-US" smtClean="0"/>
-              <a:t>5/23/2018</a:t>
+              <a:t>5/25/2018</a:t>
             </a:fld>
             <a:endParaRPr lang="en-US"/>
           </a:p>
@@ -8888,7 +8895,7 @@
           <a:p>
             <a:fld id="{DA0418CF-9665-4435-A195-0B93DCBC678D}" type="datetimeFigureOut">
               <a:rPr lang="en-US" smtClean="0"/>
-              <a:t>5/23/2018</a:t>
+              <a:t>5/25/2018</a:t>
             </a:fld>
             <a:endParaRPr lang="en-US"/>
           </a:p>
@@ -9298,7 +9305,7 @@
           <a:p>
             <a:fld id="{DA0418CF-9665-4435-A195-0B93DCBC678D}" type="datetimeFigureOut">
               <a:rPr lang="en-US" smtClean="0"/>
-              <a:t>5/23/2018</a:t>
+              <a:t>5/25/2018</a:t>
             </a:fld>
             <a:endParaRPr lang="en-US"/>
           </a:p>
@@ -9425,7 +9432,7 @@
           <a:p>
             <a:fld id="{DA0418CF-9665-4435-A195-0B93DCBC678D}" type="datetimeFigureOut">
               <a:rPr lang="en-US" smtClean="0"/>
-              <a:t>5/23/2018</a:t>
+              <a:t>5/25/2018</a:t>
             </a:fld>
             <a:endParaRPr lang="en-US"/>
           </a:p>
@@ -9520,7 +9527,7 @@
           <a:p>
             <a:fld id="{DA0418CF-9665-4435-A195-0B93DCBC678D}" type="datetimeFigureOut">
               <a:rPr lang="en-US" smtClean="0"/>
-              <a:t>5/23/2018</a:t>
+              <a:t>5/25/2018</a:t>
             </a:fld>
             <a:endParaRPr lang="en-US"/>
           </a:p>
@@ -10606,7 +10613,7 @@
           <a:p>
             <a:fld id="{DA0418CF-9665-4435-A195-0B93DCBC678D}" type="datetimeFigureOut">
               <a:rPr lang="en-US" smtClean="0"/>
-              <a:t>5/23/2018</a:t>
+              <a:t>5/25/2018</a:t>
             </a:fld>
             <a:endParaRPr lang="en-US"/>
           </a:p>
@@ -11719,7 +11726,7 @@
           <a:p>
             <a:fld id="{DA0418CF-9665-4435-A195-0B93DCBC678D}" type="datetimeFigureOut">
               <a:rPr lang="en-US" smtClean="0"/>
-              <a:t>5/23/2018</a:t>
+              <a:t>5/25/2018</a:t>
             </a:fld>
             <a:endParaRPr lang="en-US"/>
           </a:p>
@@ -12716,7 +12723,7 @@
           <a:p>
             <a:fld id="{DA0418CF-9665-4435-A195-0B93DCBC678D}" type="datetimeFigureOut">
               <a:rPr lang="en-US" smtClean="0"/>
-              <a:t>5/23/2018</a:t>
+              <a:t>5/25/2018</a:t>
             </a:fld>
             <a:endParaRPr lang="en-US"/>
           </a:p>
@@ -13331,7 +13338,7 @@
           <a:p>
             <a:r>
               <a:rPr lang="en-US" dirty="0"/>
-              <a:t>Using Monte Carlo EXPERIMENT</a:t>
+              <a:t>Using the Monte Carlo method</a:t>
             </a:r>
           </a:p>
         </p:txBody>
@@ -13415,10 +13422,84 @@
           <a:bodyPr/>
           <a:lstStyle/>
           <a:p>
-            <a:endParaRPr lang="en-US"/>
+            <a:r>
+              <a:rPr lang="en-US" dirty="0"/>
+              <a:t>World Cup is an event that takes place every 4 years.</a:t>
+            </a:r>
+          </a:p>
+          <a:p>
+            <a:r>
+              <a:rPr lang="en-US" dirty="0"/>
+              <a:t>Largest international soccer tournament.</a:t>
+            </a:r>
+          </a:p>
+          <a:p>
+            <a:r>
+              <a:rPr lang="en-US" dirty="0"/>
+              <a:t>Largest sport event in the world. </a:t>
+            </a:r>
+          </a:p>
+          <a:p>
+            <a:r>
+              <a:rPr lang="en-US" dirty="0"/>
+              <a:t>32 teams from all continents compete.</a:t>
+            </a:r>
+          </a:p>
+          <a:p>
+            <a:r>
+              <a:rPr lang="en-US" dirty="0"/>
+              <a:t>A total of 64 games are played.</a:t>
+            </a:r>
           </a:p>
         </p:txBody>
       </p:sp>
+      <p:pic>
+        <p:nvPicPr>
+          <p:cNvPr id="1026" name="Picture 2" descr="2018 FIFA World Cup.svg">
+            <a:extLst>
+              <a:ext uri="{FF2B5EF4-FFF2-40B4-BE49-F238E27FC236}">
+                <a16:creationId xmlns:a16="http://schemas.microsoft.com/office/drawing/2014/main" id="{55B013C2-E8AA-4E6D-8720-14EF66EAC3D6}"/>
+              </a:ext>
+            </a:extLst>
+          </p:cNvPr>
+          <p:cNvPicPr>
+            <a:picLocks noChangeAspect="1" noChangeArrowheads="1"/>
+          </p:cNvPicPr>
+          <p:nvPr/>
+        </p:nvPicPr>
+        <p:blipFill>
+          <a:blip r:embed="rId2">
+            <a:extLst>
+              <a:ext uri="{28A0092B-C50C-407E-A947-70E740481C1C}">
+                <a14:useLocalDpi xmlns:a14="http://schemas.microsoft.com/office/drawing/2010/main" val="0"/>
+              </a:ext>
+            </a:extLst>
+          </a:blip>
+          <a:srcRect/>
+          <a:stretch>
+            <a:fillRect/>
+          </a:stretch>
+        </p:blipFill>
+        <p:spPr bwMode="auto">
+          <a:xfrm>
+            <a:off x="7860166" y="2603500"/>
+            <a:ext cx="2676525" cy="2952750"/>
+          </a:xfrm>
+          <a:prstGeom prst="rect">
+            <a:avLst/>
+          </a:prstGeom>
+          <a:noFill/>
+          <a:extLst>
+            <a:ext uri="{909E8E84-426E-40DD-AFC4-6F175D3DCCD1}">
+              <a14:hiddenFill xmlns:a14="http://schemas.microsoft.com/office/drawing/2010/main">
+                <a:solidFill>
+                  <a:srgbClr val="FFFFFF"/>
+                </a:solidFill>
+              </a14:hiddenFill>
+            </a:ext>
+          </a:extLst>
+        </p:spPr>
+      </p:pic>
     </p:spTree>
     <p:extLst>
       <p:ext uri="{BB962C8B-B14F-4D97-AF65-F5344CB8AC3E}">
@@ -13498,7 +13579,70 @@
           <a:bodyPr/>
           <a:lstStyle/>
           <a:p>
-            <a:endParaRPr lang="en-US"/>
+            <a:r>
+              <a:rPr lang="en-US" dirty="0"/>
+              <a:t>Teams are split into a </a:t>
+            </a:r>
+            <a:r>
+              <a:rPr lang="en-US" b="1" dirty="0"/>
+              <a:t>4 different categories </a:t>
+            </a:r>
+            <a:r>
+              <a:rPr lang="en-US" dirty="0"/>
+              <a:t>based on their FIFA ranking.</a:t>
+            </a:r>
+          </a:p>
+          <a:p>
+            <a:r>
+              <a:rPr lang="en-US" dirty="0"/>
+              <a:t>Each team is randomly placed in one of the </a:t>
+            </a:r>
+            <a:r>
+              <a:rPr lang="en-US" b="1" dirty="0"/>
+              <a:t>8 letter groups</a:t>
+            </a:r>
+            <a:r>
+              <a:rPr lang="en-US" dirty="0"/>
+              <a:t>.</a:t>
+            </a:r>
+          </a:p>
+          <a:p>
+            <a:r>
+              <a:rPr lang="en-US" b="1" dirty="0"/>
+              <a:t>48 games</a:t>
+            </a:r>
+            <a:r>
+              <a:rPr lang="en-US" dirty="0"/>
+              <a:t> in the group stage, 6 per group.</a:t>
+            </a:r>
+          </a:p>
+          <a:p>
+            <a:r>
+              <a:rPr lang="en-US" dirty="0"/>
+              <a:t>The </a:t>
+            </a:r>
+            <a:r>
+              <a:rPr lang="en-US" b="1" dirty="0"/>
+              <a:t>best two teams </a:t>
+            </a:r>
+            <a:r>
+              <a:rPr lang="en-US" dirty="0"/>
+              <a:t>in each group get selected to move to the round of 16. At this point the team that loses a game is eliminated. </a:t>
+            </a:r>
+          </a:p>
+          <a:p>
+            <a:r>
+              <a:rPr lang="en-US" dirty="0"/>
+              <a:t>After winning 3 games the team makes it to the </a:t>
+            </a:r>
+            <a:r>
+              <a:rPr lang="en-US" b="1" dirty="0"/>
+              <a:t>World Cup final</a:t>
+            </a:r>
+            <a:r>
+              <a:rPr lang="en-US" dirty="0"/>
+              <a:t>.</a:t>
+            </a:r>
           </a:p>
         </p:txBody>
       </p:sp>
@@ -13555,7 +13699,7 @@
           <a:p>
             <a:r>
               <a:rPr lang="en-US" dirty="0"/>
-              <a:t>Monte Carlo Experiment</a:t>
+              <a:t>Monte Carlo Method</a:t>
             </a:r>
           </a:p>
         </p:txBody>
@@ -13581,7 +13725,40 @@
           <a:bodyPr/>
           <a:lstStyle/>
           <a:p>
-            <a:endParaRPr lang="en-US"/>
+            <a:r>
+              <a:rPr lang="en-US" b="1" dirty="0"/>
+              <a:t>Monte Carlo methods </a:t>
+            </a:r>
+            <a:r>
+              <a:rPr lang="en-US" dirty="0"/>
+              <a:t>are a broad class of computational algorithms that rely on repeated random sampling to obtain numerical results. </a:t>
+            </a:r>
+          </a:p>
+          <a:p>
+            <a:r>
+              <a:rPr lang="en-US" dirty="0"/>
+              <a:t>Used for optimization, numerical integration, and </a:t>
+            </a:r>
+            <a:r>
+              <a:rPr lang="en-US" b="1" dirty="0"/>
+              <a:t>generating draws from a probability distribution</a:t>
+            </a:r>
+            <a:r>
+              <a:rPr lang="en-US" dirty="0"/>
+              <a:t>.</a:t>
+            </a:r>
+          </a:p>
+          <a:p>
+            <a:r>
+              <a:rPr lang="en-US" dirty="0"/>
+              <a:t>A better team is still more likely to win and move on than its lower ranked opponent.</a:t>
+            </a:r>
+          </a:p>
+          <a:p>
+            <a:r>
+              <a:rPr lang="en-US" dirty="0"/>
+              <a:t>Run 10,000 simulations and count how many times each team made it to the different stages.</a:t>
+            </a:r>
           </a:p>
         </p:txBody>
       </p:sp>
@@ -13620,6 +13797,202 @@
           <p:cNvPr id="2" name="Title 1">
             <a:extLst>
               <a:ext uri="{FF2B5EF4-FFF2-40B4-BE49-F238E27FC236}">
+                <a16:creationId xmlns:a16="http://schemas.microsoft.com/office/drawing/2014/main" id="{F849ABAD-FDD3-4EF7-B957-048FC6817BAD}"/>
+              </a:ext>
+            </a:extLst>
+          </p:cNvPr>
+          <p:cNvSpPr>
+            <a:spLocks noGrp="1"/>
+          </p:cNvSpPr>
+          <p:nvPr>
+            <p:ph type="title"/>
+          </p:nvPr>
+        </p:nvSpPr>
+        <p:spPr/>
+        <p:txBody>
+          <a:bodyPr/>
+          <a:lstStyle/>
+          <a:p>
+            <a:r>
+              <a:rPr lang="en-US" dirty="0"/>
+              <a:t>Elo rating system</a:t>
+            </a:r>
+          </a:p>
+        </p:txBody>
+      </p:sp>
+      <p:sp>
+        <p:nvSpPr>
+          <p:cNvPr id="3" name="Content Placeholder 2">
+            <a:extLst>
+              <a:ext uri="{FF2B5EF4-FFF2-40B4-BE49-F238E27FC236}">
+                <a16:creationId xmlns:a16="http://schemas.microsoft.com/office/drawing/2014/main" id="{9356B2B9-C3FD-4B7A-9921-63C7EBF61DB2}"/>
+              </a:ext>
+            </a:extLst>
+          </p:cNvPr>
+          <p:cNvSpPr>
+            <a:spLocks noGrp="1"/>
+          </p:cNvSpPr>
+          <p:nvPr>
+            <p:ph idx="1"/>
+          </p:nvPr>
+        </p:nvSpPr>
+        <p:spPr/>
+        <p:txBody>
+          <a:bodyPr>
+            <a:normAutofit/>
+          </a:bodyPr>
+          <a:lstStyle/>
+          <a:p>
+            <a:r>
+              <a:rPr lang="en-US" dirty="0"/>
+              <a:t>The Elo rating system is a method for </a:t>
+            </a:r>
+            <a:r>
+              <a:rPr lang="en-US" b="1" dirty="0"/>
+              <a:t>calculating the relative skill levels </a:t>
+            </a:r>
+            <a:r>
+              <a:rPr lang="en-US" dirty="0"/>
+              <a:t>of players in zero-sum games such as chess.</a:t>
+            </a:r>
+          </a:p>
+          <a:p>
+            <a:r>
+              <a:rPr lang="en-US" dirty="0"/>
+              <a:t>It has gained popularity as a rating system and now is used in competitive video games and sports. </a:t>
+            </a:r>
+          </a:p>
+          <a:p>
+            <a:r>
+              <a:rPr lang="en-US" dirty="0"/>
+              <a:t>The difference in the ratings between two players serves as a predictor of the outcome of a match. </a:t>
+            </a:r>
+          </a:p>
+          <a:p>
+            <a:r>
+              <a:rPr lang="el-GR" b="1" dirty="0"/>
+              <a:t>Δ</a:t>
+            </a:r>
+            <a:r>
+              <a:rPr lang="en-US" b="1" dirty="0"/>
+              <a:t>100 points  </a:t>
+            </a:r>
+            <a:r>
+              <a:rPr lang="en-US" dirty="0">
+                <a:sym typeface="Wingdings" panose="05000000000000000000" pitchFamily="2" charset="2"/>
+              </a:rPr>
+              <a:t> </a:t>
+            </a:r>
+            <a:r>
+              <a:rPr lang="en-US" dirty="0"/>
+              <a:t>expected score for the stronger player is </a:t>
+            </a:r>
+            <a:r>
+              <a:rPr lang="en-US" b="1" dirty="0"/>
+              <a:t>64%</a:t>
+            </a:r>
+          </a:p>
+          <a:p>
+            <a:r>
+              <a:rPr lang="el-GR" b="1" dirty="0"/>
+              <a:t>Δ </a:t>
+            </a:r>
+            <a:r>
+              <a:rPr lang="en-US" b="1" dirty="0"/>
+              <a:t>200 points </a:t>
+            </a:r>
+            <a:r>
+              <a:rPr lang="en-US" dirty="0">
+                <a:sym typeface="Wingdings" panose="05000000000000000000" pitchFamily="2" charset="2"/>
+              </a:rPr>
+              <a:t></a:t>
+            </a:r>
+            <a:r>
+              <a:rPr lang="en-US" dirty="0"/>
+              <a:t> expected score for the stronger player is </a:t>
+            </a:r>
+            <a:r>
+              <a:rPr lang="en-US" b="1" dirty="0"/>
+              <a:t>76%</a:t>
+            </a:r>
+            <a:r>
+              <a:rPr lang="en-US" dirty="0"/>
+              <a:t>.</a:t>
+            </a:r>
+          </a:p>
+          <a:p>
+            <a:endParaRPr lang="en-US" dirty="0"/>
+          </a:p>
+          <a:p>
+            <a:endParaRPr lang="en-US" dirty="0"/>
+          </a:p>
+        </p:txBody>
+      </p:sp>
+      <p:pic>
+        <p:nvPicPr>
+          <p:cNvPr id="5" name="Picture 4">
+            <a:extLst>
+              <a:ext uri="{FF2B5EF4-FFF2-40B4-BE49-F238E27FC236}">
+                <a16:creationId xmlns:a16="http://schemas.microsoft.com/office/drawing/2014/main" id="{F97735EE-6EA1-48C0-92AF-E7A561F050B7}"/>
+              </a:ext>
+            </a:extLst>
+          </p:cNvPr>
+          <p:cNvPicPr>
+            <a:picLocks noChangeAspect="1"/>
+          </p:cNvPicPr>
+          <p:nvPr/>
+        </p:nvPicPr>
+        <p:blipFill>
+          <a:blip r:embed="rId2"/>
+          <a:stretch>
+            <a:fillRect/>
+          </a:stretch>
+        </p:blipFill>
+        <p:spPr>
+          <a:xfrm>
+            <a:off x="4301411" y="5388699"/>
+            <a:ext cx="2268603" cy="1120569"/>
+          </a:xfrm>
+          <a:prstGeom prst="rect">
+            <a:avLst/>
+          </a:prstGeom>
+        </p:spPr>
+      </p:pic>
+    </p:spTree>
+    <p:extLst>
+      <p:ext uri="{BB962C8B-B14F-4D97-AF65-F5344CB8AC3E}">
+        <p14:creationId xmlns:p14="http://schemas.microsoft.com/office/powerpoint/2010/main" val="4108348415"/>
+      </p:ext>
+    </p:extLst>
+  </p:cSld>
+  <p:clrMapOvr>
+    <a:masterClrMapping/>
+  </p:clrMapOvr>
+</p:sld>
+</file>
+
+<file path=ppt/slides/slide6.xml><?xml version="1.0" encoding="utf-8"?>
+<p:sld xmlns:a="http://schemas.openxmlformats.org/drawingml/2006/main" xmlns:r="http://schemas.openxmlformats.org/officeDocument/2006/relationships" xmlns:p="http://schemas.openxmlformats.org/presentationml/2006/main">
+  <p:cSld>
+    <p:spTree>
+      <p:nvGrpSpPr>
+        <p:cNvPr id="1" name=""/>
+        <p:cNvGrpSpPr/>
+        <p:nvPr/>
+      </p:nvGrpSpPr>
+      <p:grpSpPr>
+        <a:xfrm>
+          <a:off x="0" y="0"/>
+          <a:ext cx="0" cy="0"/>
+          <a:chOff x="0" y="0"/>
+          <a:chExt cx="0" cy="0"/>
+        </a:xfrm>
+      </p:grpSpPr>
+      <p:sp>
+        <p:nvSpPr>
+          <p:cNvPr id="2" name="Title 1">
+            <a:extLst>
+              <a:ext uri="{FF2B5EF4-FFF2-40B4-BE49-F238E27FC236}">
                 <a16:creationId xmlns:a16="http://schemas.microsoft.com/office/drawing/2014/main" id="{46777C8D-2995-4716-AF13-48F4EF95E058}"/>
               </a:ext>
             </a:extLst>
@@ -13638,7 +14011,7 @@
           <a:p>
             <a:r>
               <a:rPr lang="en-US" dirty="0"/>
-              <a:t>Assumptions</a:t>
+              <a:t>Assumptions/Simplifications</a:t>
             </a:r>
           </a:p>
         </p:txBody>
@@ -13664,7 +14037,40 @@
           <a:bodyPr/>
           <a:lstStyle/>
           <a:p>
-            <a:endParaRPr lang="en-US"/>
+            <a:r>
+              <a:rPr lang="en-US" b="1" dirty="0"/>
+              <a:t>No tied games </a:t>
+            </a:r>
+            <a:r>
+              <a:rPr lang="en-US" dirty="0"/>
+              <a:t>allowed in the group stage.</a:t>
+            </a:r>
+          </a:p>
+          <a:p>
+            <a:r>
+              <a:rPr lang="en-US" dirty="0"/>
+              <a:t>No goals, teams win or lose.</a:t>
+            </a:r>
+          </a:p>
+          <a:p>
+            <a:r>
+              <a:rPr lang="en-US" dirty="0"/>
+              <a:t>At the end of the group stage, if more than two teams end up tied for the top two positions, two will get </a:t>
+            </a:r>
+            <a:r>
+              <a:rPr lang="en-US" b="1" dirty="0"/>
+              <a:t>randomly selected to move forward.</a:t>
+            </a:r>
+          </a:p>
+          <a:p>
+            <a:r>
+              <a:rPr lang="en-US" b="1" dirty="0"/>
+              <a:t>Elo rating </a:t>
+            </a:r>
+            <a:r>
+              <a:rPr lang="en-US" dirty="0"/>
+              <a:t>is enough to predict the win rate between two teams.</a:t>
+            </a:r>
           </a:p>
         </p:txBody>
       </p:sp>
@@ -13681,7 +14087,90 @@
 </p:sld>
 </file>
 
-<file path=ppt/slides/slide6.xml><?xml version="1.0" encoding="utf-8"?>
+<file path=ppt/slides/slide7.xml><?xml version="1.0" encoding="utf-8"?>
+<p:sld xmlns:a="http://schemas.openxmlformats.org/drawingml/2006/main" xmlns:r="http://schemas.openxmlformats.org/officeDocument/2006/relationships" xmlns:p="http://schemas.openxmlformats.org/presentationml/2006/main">
+  <p:cSld>
+    <p:spTree>
+      <p:nvGrpSpPr>
+        <p:cNvPr id="1" name=""/>
+        <p:cNvGrpSpPr/>
+        <p:nvPr/>
+      </p:nvGrpSpPr>
+      <p:grpSpPr>
+        <a:xfrm>
+          <a:off x="0" y="0"/>
+          <a:ext cx="0" cy="0"/>
+          <a:chOff x="0" y="0"/>
+          <a:chExt cx="0" cy="0"/>
+        </a:xfrm>
+      </p:grpSpPr>
+      <p:sp>
+        <p:nvSpPr>
+          <p:cNvPr id="2" name="Title 1">
+            <a:extLst>
+              <a:ext uri="{FF2B5EF4-FFF2-40B4-BE49-F238E27FC236}">
+                <a16:creationId xmlns:a16="http://schemas.microsoft.com/office/drawing/2014/main" id="{5C4232FD-5C2B-40E8-AA6A-76C99385F52B}"/>
+              </a:ext>
+            </a:extLst>
+          </p:cNvPr>
+          <p:cNvSpPr>
+            <a:spLocks noGrp="1"/>
+          </p:cNvSpPr>
+          <p:nvPr>
+            <p:ph type="title"/>
+          </p:nvPr>
+        </p:nvSpPr>
+        <p:spPr/>
+        <p:txBody>
+          <a:bodyPr/>
+          <a:lstStyle/>
+          <a:p>
+            <a:r>
+              <a:rPr lang="en-US" dirty="0"/>
+              <a:t>Code..</a:t>
+            </a:r>
+          </a:p>
+        </p:txBody>
+      </p:sp>
+      <p:sp>
+        <p:nvSpPr>
+          <p:cNvPr id="3" name="Content Placeholder 2">
+            <a:extLst>
+              <a:ext uri="{FF2B5EF4-FFF2-40B4-BE49-F238E27FC236}">
+                <a16:creationId xmlns:a16="http://schemas.microsoft.com/office/drawing/2014/main" id="{EE9088CA-4BFF-437A-B4B1-769B7EFEA0EC}"/>
+              </a:ext>
+            </a:extLst>
+          </p:cNvPr>
+          <p:cNvSpPr>
+            <a:spLocks noGrp="1"/>
+          </p:cNvSpPr>
+          <p:nvPr>
+            <p:ph idx="1"/>
+          </p:nvPr>
+        </p:nvSpPr>
+        <p:spPr/>
+        <p:txBody>
+          <a:bodyPr/>
+          <a:lstStyle/>
+          <a:p>
+            <a:endParaRPr lang="en-US" dirty="0"/>
+          </a:p>
+        </p:txBody>
+      </p:sp>
+    </p:spTree>
+    <p:extLst>
+      <p:ext uri="{BB962C8B-B14F-4D97-AF65-F5344CB8AC3E}">
+        <p14:creationId xmlns:p14="http://schemas.microsoft.com/office/powerpoint/2010/main" val="1101092984"/>
+      </p:ext>
+    </p:extLst>
+  </p:cSld>
+  <p:clrMapOvr>
+    <a:masterClrMapping/>
+  </p:clrMapOvr>
+</p:sld>
+</file>
+
+<file path=ppt/slides/slide8.xml><?xml version="1.0" encoding="utf-8"?>
 <p:sld xmlns:a="http://schemas.openxmlformats.org/drawingml/2006/main" xmlns:r="http://schemas.openxmlformats.org/officeDocument/2006/relationships" xmlns:p="http://schemas.openxmlformats.org/presentationml/2006/main">
   <p:cSld>
     <p:spTree>
@@ -13726,31 +14215,1425 @@
           </a:p>
         </p:txBody>
       </p:sp>
-      <p:sp>
-        <p:nvSpPr>
-          <p:cNvPr id="3" name="Content Placeholder 2">
+      <p:graphicFrame>
+        <p:nvGraphicFramePr>
+          <p:cNvPr id="5" name="Content Placeholder 4">
             <a:extLst>
               <a:ext uri="{FF2B5EF4-FFF2-40B4-BE49-F238E27FC236}">
-                <a16:creationId xmlns:a16="http://schemas.microsoft.com/office/drawing/2014/main" id="{173BF9E6-8D8F-4178-A5D8-E6572F8AA783}"/>
+                <a16:creationId xmlns:a16="http://schemas.microsoft.com/office/drawing/2014/main" id="{D422660A-A1E2-4DC4-B920-0C69AD5F920D}"/>
               </a:ext>
             </a:extLst>
           </p:cNvPr>
-          <p:cNvSpPr>
-            <a:spLocks noGrp="1"/>
-          </p:cNvSpPr>
+          <p:cNvGraphicFramePr>
+            <a:graphicFrameLocks noGrp="1"/>
+          </p:cNvGraphicFramePr>
           <p:nvPr>
             <p:ph idx="1"/>
           </p:nvPr>
-        </p:nvSpPr>
-        <p:spPr/>
-        <p:txBody>
-          <a:bodyPr/>
-          <a:lstStyle/>
-          <a:p>
-            <a:endParaRPr lang="en-US"/>
-          </a:p>
-        </p:txBody>
-      </p:sp>
+        </p:nvGraphicFramePr>
+        <p:xfrm>
+          <a:off x="1370806" y="3511550"/>
+          <a:ext cx="8394700" cy="1600200"/>
+        </p:xfrm>
+        <a:graphic>
+          <a:graphicData uri="http://schemas.openxmlformats.org/drawingml/2006/table">
+            <a:tbl>
+              <a:tblPr>
+                <a:tableStyleId>{5C22544A-7EE6-4342-B048-85BDC9FD1C3A}</a:tableStyleId>
+              </a:tblPr>
+              <a:tblGrid>
+                <a:gridCol w="1094547">
+                  <a:extLst>
+                    <a:ext uri="{9D8B030D-6E8A-4147-A177-3AD203B41FA5}">
+                      <a16:colId xmlns:a16="http://schemas.microsoft.com/office/drawing/2014/main" val="3689015652"/>
+                    </a:ext>
+                  </a:extLst>
+                </a:gridCol>
+                <a:gridCol w="1763966">
+                  <a:extLst>
+                    <a:ext uri="{9D8B030D-6E8A-4147-A177-3AD203B41FA5}">
+                      <a16:colId xmlns:a16="http://schemas.microsoft.com/office/drawing/2014/main" val="2748209524"/>
+                    </a:ext>
+                  </a:extLst>
+                </a:gridCol>
+                <a:gridCol w="1725894">
+                  <a:extLst>
+                    <a:ext uri="{9D8B030D-6E8A-4147-A177-3AD203B41FA5}">
+                      <a16:colId xmlns:a16="http://schemas.microsoft.com/office/drawing/2014/main" val="3284026194"/>
+                    </a:ext>
+                  </a:extLst>
+                </a:gridCol>
+                <a:gridCol w="1256350">
+                  <a:extLst>
+                    <a:ext uri="{9D8B030D-6E8A-4147-A177-3AD203B41FA5}">
+                      <a16:colId xmlns:a16="http://schemas.microsoft.com/office/drawing/2014/main" val="2838793164"/>
+                    </a:ext>
+                  </a:extLst>
+                </a:gridCol>
+                <a:gridCol w="1116755">
+                  <a:extLst>
+                    <a:ext uri="{9D8B030D-6E8A-4147-A177-3AD203B41FA5}">
+                      <a16:colId xmlns:a16="http://schemas.microsoft.com/office/drawing/2014/main" val="1011852159"/>
+                    </a:ext>
+                  </a:extLst>
+                </a:gridCol>
+                <a:gridCol w="723353">
+                  <a:extLst>
+                    <a:ext uri="{9D8B030D-6E8A-4147-A177-3AD203B41FA5}">
+                      <a16:colId xmlns:a16="http://schemas.microsoft.com/office/drawing/2014/main" val="1775756007"/>
+                    </a:ext>
+                  </a:extLst>
+                </a:gridCol>
+                <a:gridCol w="713835">
+                  <a:extLst>
+                    <a:ext uri="{9D8B030D-6E8A-4147-A177-3AD203B41FA5}">
+                      <a16:colId xmlns:a16="http://schemas.microsoft.com/office/drawing/2014/main" val="1239064530"/>
+                    </a:ext>
+                  </a:extLst>
+                </a:gridCol>
+              </a:tblGrid>
+              <a:tr h="200025">
+                <a:tc>
+                  <a:txBody>
+                    <a:bodyPr/>
+                    <a:lstStyle/>
+                    <a:p>
+                      <a:pPr algn="l" fontAlgn="b"/>
+                      <a:endParaRPr lang="en-US" sz="1100" b="0" i="0" u="none" strike="noStrike" dirty="0">
+                        <a:solidFill>
+                          <a:srgbClr val="000000"/>
+                        </a:solidFill>
+                        <a:effectLst/>
+                        <a:latin typeface="Calibri" panose="020F0502020204030204" pitchFamily="34" charset="0"/>
+                      </a:endParaRPr>
+                    </a:p>
+                  </a:txBody>
+                  <a:tcPr marL="9525" marR="9525" marT="9525" marB="0" anchor="b"/>
+                </a:tc>
+                <a:tc>
+                  <a:txBody>
+                    <a:bodyPr/>
+                    <a:lstStyle/>
+                    <a:p>
+                      <a:pPr algn="l" fontAlgn="ctr"/>
+                      <a:r>
+                        <a:rPr lang="en-US" sz="1100" u="none" strike="noStrike">
+                          <a:effectLst/>
+                        </a:rPr>
+                        <a:t>Second_Group_Stage</a:t>
+                      </a:r>
+                      <a:endParaRPr lang="en-US" sz="1100" b="1" i="0" u="none" strike="noStrike">
+                        <a:solidFill>
+                          <a:srgbClr val="000000"/>
+                        </a:solidFill>
+                        <a:effectLst/>
+                        <a:latin typeface="Arial" panose="020B0604020202020204" pitchFamily="34" charset="0"/>
+                      </a:endParaRPr>
+                    </a:p>
+                  </a:txBody>
+                  <a:tcPr marL="171450" marR="9525" marT="9525" marB="0" anchor="ctr"/>
+                </a:tc>
+                <a:tc>
+                  <a:txBody>
+                    <a:bodyPr/>
+                    <a:lstStyle/>
+                    <a:p>
+                      <a:pPr algn="l" fontAlgn="ctr"/>
+                      <a:r>
+                        <a:rPr lang="en-US" sz="1100" u="none" strike="noStrike">
+                          <a:effectLst/>
+                        </a:rPr>
+                        <a:t>Winner_Group_Stage</a:t>
+                      </a:r>
+                      <a:endParaRPr lang="en-US" sz="1100" b="1" i="0" u="none" strike="noStrike">
+                        <a:solidFill>
+                          <a:srgbClr val="000000"/>
+                        </a:solidFill>
+                        <a:effectLst/>
+                        <a:latin typeface="Arial" panose="020B0604020202020204" pitchFamily="34" charset="0"/>
+                      </a:endParaRPr>
+                    </a:p>
+                  </a:txBody>
+                  <a:tcPr marL="171450" marR="9525" marT="9525" marB="0" anchor="ctr"/>
+                </a:tc>
+                <a:tc>
+                  <a:txBody>
+                    <a:bodyPr/>
+                    <a:lstStyle/>
+                    <a:p>
+                      <a:pPr algn="l" fontAlgn="ctr"/>
+                      <a:r>
+                        <a:rPr lang="en-US" sz="1100" u="none" strike="noStrike">
+                          <a:effectLst/>
+                        </a:rPr>
+                        <a:t>Quater-Finalist</a:t>
+                      </a:r>
+                      <a:endParaRPr lang="en-US" sz="1100" b="1" i="0" u="none" strike="noStrike">
+                        <a:solidFill>
+                          <a:srgbClr val="000000"/>
+                        </a:solidFill>
+                        <a:effectLst/>
+                        <a:latin typeface="Arial" panose="020B0604020202020204" pitchFamily="34" charset="0"/>
+                      </a:endParaRPr>
+                    </a:p>
+                  </a:txBody>
+                  <a:tcPr marL="171450" marR="9525" marT="9525" marB="0" anchor="ctr"/>
+                </a:tc>
+                <a:tc>
+                  <a:txBody>
+                    <a:bodyPr/>
+                    <a:lstStyle/>
+                    <a:p>
+                      <a:pPr algn="l" fontAlgn="ctr"/>
+                      <a:r>
+                        <a:rPr lang="en-US" sz="1100" u="none" strike="noStrike">
+                          <a:effectLst/>
+                        </a:rPr>
+                        <a:t>Semi-Finalist</a:t>
+                      </a:r>
+                      <a:endParaRPr lang="en-US" sz="1100" b="1" i="0" u="none" strike="noStrike">
+                        <a:solidFill>
+                          <a:srgbClr val="000000"/>
+                        </a:solidFill>
+                        <a:effectLst/>
+                        <a:latin typeface="Arial" panose="020B0604020202020204" pitchFamily="34" charset="0"/>
+                      </a:endParaRPr>
+                    </a:p>
+                  </a:txBody>
+                  <a:tcPr marL="171450" marR="9525" marT="9525" marB="0" anchor="ctr"/>
+                </a:tc>
+                <a:tc>
+                  <a:txBody>
+                    <a:bodyPr/>
+                    <a:lstStyle/>
+                    <a:p>
+                      <a:pPr algn="l" fontAlgn="ctr"/>
+                      <a:r>
+                        <a:rPr lang="en-US" sz="1100" u="none" strike="noStrike">
+                          <a:effectLst/>
+                        </a:rPr>
+                        <a:t>Finalist</a:t>
+                      </a:r>
+                      <a:endParaRPr lang="en-US" sz="1100" b="1" i="0" u="none" strike="noStrike">
+                        <a:solidFill>
+                          <a:srgbClr val="000000"/>
+                        </a:solidFill>
+                        <a:effectLst/>
+                        <a:latin typeface="Arial" panose="020B0604020202020204" pitchFamily="34" charset="0"/>
+                      </a:endParaRPr>
+                    </a:p>
+                  </a:txBody>
+                  <a:tcPr marL="171450" marR="9525" marT="9525" marB="0" anchor="ctr"/>
+                </a:tc>
+                <a:tc>
+                  <a:txBody>
+                    <a:bodyPr/>
+                    <a:lstStyle/>
+                    <a:p>
+                      <a:pPr algn="l" fontAlgn="ctr"/>
+                      <a:r>
+                        <a:rPr lang="en-US" sz="1100" u="none" strike="noStrike">
+                          <a:effectLst/>
+                        </a:rPr>
+                        <a:t>Winner</a:t>
+                      </a:r>
+                      <a:endParaRPr lang="en-US" sz="1100" b="1" i="0" u="none" strike="noStrike">
+                        <a:solidFill>
+                          <a:srgbClr val="000000"/>
+                        </a:solidFill>
+                        <a:effectLst/>
+                        <a:latin typeface="Arial" panose="020B0604020202020204" pitchFamily="34" charset="0"/>
+                      </a:endParaRPr>
+                    </a:p>
+                  </a:txBody>
+                  <a:tcPr marL="171450" marR="9525" marT="9525" marB="0" anchor="ctr"/>
+                </a:tc>
+                <a:extLst>
+                  <a:ext uri="{0D108BD9-81ED-4DB2-BD59-A6C34878D82A}">
+                    <a16:rowId xmlns:a16="http://schemas.microsoft.com/office/drawing/2014/main" val="1450660008"/>
+                  </a:ext>
+                </a:extLst>
+              </a:tr>
+              <a:tr h="200025">
+                <a:tc>
+                  <a:txBody>
+                    <a:bodyPr/>
+                    <a:lstStyle/>
+                    <a:p>
+                      <a:pPr algn="l" fontAlgn="ctr"/>
+                      <a:r>
+                        <a:rPr lang="en-US" sz="1100" u="none" strike="noStrike">
+                          <a:effectLst/>
+                        </a:rPr>
+                        <a:t>Country</a:t>
+                      </a:r>
+                      <a:endParaRPr lang="en-US" sz="1100" b="1" i="0" u="none" strike="noStrike">
+                        <a:solidFill>
+                          <a:srgbClr val="000000"/>
+                        </a:solidFill>
+                        <a:effectLst/>
+                        <a:latin typeface="Arial" panose="020B0604020202020204" pitchFamily="34" charset="0"/>
+                      </a:endParaRPr>
+                    </a:p>
+                  </a:txBody>
+                  <a:tcPr marL="171450" marR="9525" marT="9525" marB="0" anchor="ctr"/>
+                </a:tc>
+                <a:tc>
+                  <a:txBody>
+                    <a:bodyPr/>
+                    <a:lstStyle/>
+                    <a:p>
+                      <a:pPr algn="l" fontAlgn="ctr"/>
+                      <a:r>
+                        <a:rPr lang="en-US" sz="1100" u="none" strike="noStrike" dirty="0">
+                          <a:effectLst/>
+                        </a:rPr>
+                        <a:t> </a:t>
+                      </a:r>
+                      <a:endParaRPr lang="en-US" sz="1100" b="1" i="0" u="none" strike="noStrike" dirty="0">
+                        <a:solidFill>
+                          <a:srgbClr val="000000"/>
+                        </a:solidFill>
+                        <a:effectLst/>
+                        <a:latin typeface="Arial" panose="020B0604020202020204" pitchFamily="34" charset="0"/>
+                      </a:endParaRPr>
+                    </a:p>
+                  </a:txBody>
+                  <a:tcPr marL="171450" marR="9525" marT="9525" marB="0" anchor="ctr"/>
+                </a:tc>
+                <a:tc>
+                  <a:txBody>
+                    <a:bodyPr/>
+                    <a:lstStyle/>
+                    <a:p>
+                      <a:pPr algn="l" fontAlgn="ctr"/>
+                      <a:r>
+                        <a:rPr lang="en-US" sz="1100" u="none" strike="noStrike">
+                          <a:effectLst/>
+                        </a:rPr>
+                        <a:t> </a:t>
+                      </a:r>
+                      <a:endParaRPr lang="en-US" sz="1100" b="1" i="0" u="none" strike="noStrike">
+                        <a:solidFill>
+                          <a:srgbClr val="000000"/>
+                        </a:solidFill>
+                        <a:effectLst/>
+                        <a:latin typeface="Arial" panose="020B0604020202020204" pitchFamily="34" charset="0"/>
+                      </a:endParaRPr>
+                    </a:p>
+                  </a:txBody>
+                  <a:tcPr marL="171450" marR="9525" marT="9525" marB="0" anchor="ctr"/>
+                </a:tc>
+                <a:tc>
+                  <a:txBody>
+                    <a:bodyPr/>
+                    <a:lstStyle/>
+                    <a:p>
+                      <a:pPr algn="l" fontAlgn="ctr"/>
+                      <a:r>
+                        <a:rPr lang="en-US" sz="1100" u="none" strike="noStrike">
+                          <a:effectLst/>
+                        </a:rPr>
+                        <a:t> </a:t>
+                      </a:r>
+                      <a:endParaRPr lang="en-US" sz="1100" b="1" i="0" u="none" strike="noStrike">
+                        <a:solidFill>
+                          <a:srgbClr val="000000"/>
+                        </a:solidFill>
+                        <a:effectLst/>
+                        <a:latin typeface="Arial" panose="020B0604020202020204" pitchFamily="34" charset="0"/>
+                      </a:endParaRPr>
+                    </a:p>
+                  </a:txBody>
+                  <a:tcPr marL="171450" marR="9525" marT="9525" marB="0" anchor="ctr"/>
+                </a:tc>
+                <a:tc>
+                  <a:txBody>
+                    <a:bodyPr/>
+                    <a:lstStyle/>
+                    <a:p>
+                      <a:pPr algn="l" fontAlgn="ctr"/>
+                      <a:r>
+                        <a:rPr lang="en-US" sz="1100" u="none" strike="noStrike">
+                          <a:effectLst/>
+                        </a:rPr>
+                        <a:t> </a:t>
+                      </a:r>
+                      <a:endParaRPr lang="en-US" sz="1100" b="1" i="0" u="none" strike="noStrike">
+                        <a:solidFill>
+                          <a:srgbClr val="000000"/>
+                        </a:solidFill>
+                        <a:effectLst/>
+                        <a:latin typeface="Arial" panose="020B0604020202020204" pitchFamily="34" charset="0"/>
+                      </a:endParaRPr>
+                    </a:p>
+                  </a:txBody>
+                  <a:tcPr marL="171450" marR="9525" marT="9525" marB="0" anchor="ctr"/>
+                </a:tc>
+                <a:tc>
+                  <a:txBody>
+                    <a:bodyPr/>
+                    <a:lstStyle/>
+                    <a:p>
+                      <a:pPr algn="l" fontAlgn="ctr"/>
+                      <a:r>
+                        <a:rPr lang="en-US" sz="1100" u="none" strike="noStrike">
+                          <a:effectLst/>
+                        </a:rPr>
+                        <a:t> </a:t>
+                      </a:r>
+                      <a:endParaRPr lang="en-US" sz="1100" b="1" i="0" u="none" strike="noStrike">
+                        <a:solidFill>
+                          <a:srgbClr val="000000"/>
+                        </a:solidFill>
+                        <a:effectLst/>
+                        <a:latin typeface="Arial" panose="020B0604020202020204" pitchFamily="34" charset="0"/>
+                      </a:endParaRPr>
+                    </a:p>
+                  </a:txBody>
+                  <a:tcPr marL="171450" marR="9525" marT="9525" marB="0" anchor="ctr"/>
+                </a:tc>
+                <a:tc>
+                  <a:txBody>
+                    <a:bodyPr/>
+                    <a:lstStyle/>
+                    <a:p>
+                      <a:pPr algn="l" fontAlgn="ctr"/>
+                      <a:r>
+                        <a:rPr lang="en-US" sz="1100" u="none" strike="noStrike">
+                          <a:effectLst/>
+                        </a:rPr>
+                        <a:t> </a:t>
+                      </a:r>
+                      <a:endParaRPr lang="en-US" sz="1100" b="1" i="0" u="none" strike="noStrike">
+                        <a:solidFill>
+                          <a:srgbClr val="000000"/>
+                        </a:solidFill>
+                        <a:effectLst/>
+                        <a:latin typeface="Arial" panose="020B0604020202020204" pitchFamily="34" charset="0"/>
+                      </a:endParaRPr>
+                    </a:p>
+                  </a:txBody>
+                  <a:tcPr marL="171450" marR="9525" marT="9525" marB="0" anchor="ctr"/>
+                </a:tc>
+                <a:extLst>
+                  <a:ext uri="{0D108BD9-81ED-4DB2-BD59-A6C34878D82A}">
+                    <a16:rowId xmlns:a16="http://schemas.microsoft.com/office/drawing/2014/main" val="3338342494"/>
+                  </a:ext>
+                </a:extLst>
+              </a:tr>
+              <a:tr h="200025">
+                <a:tc>
+                  <a:txBody>
+                    <a:bodyPr/>
+                    <a:lstStyle/>
+                    <a:p>
+                      <a:pPr algn="l" fontAlgn="ctr"/>
+                      <a:r>
+                        <a:rPr lang="en-US" sz="1100" u="none" strike="noStrike" dirty="0">
+                          <a:effectLst/>
+                        </a:rPr>
+                        <a:t>Brazil</a:t>
+                      </a:r>
+                      <a:endParaRPr lang="en-US" sz="1100" b="1" i="0" u="none" strike="noStrike" dirty="0">
+                        <a:solidFill>
+                          <a:srgbClr val="000000"/>
+                        </a:solidFill>
+                        <a:effectLst/>
+                        <a:latin typeface="Arial" panose="020B0604020202020204" pitchFamily="34" charset="0"/>
+                      </a:endParaRPr>
+                    </a:p>
+                  </a:txBody>
+                  <a:tcPr marL="171450" marR="9525" marT="9525" marB="0" anchor="ctr"/>
+                </a:tc>
+                <a:tc>
+                  <a:txBody>
+                    <a:bodyPr/>
+                    <a:lstStyle/>
+                    <a:p>
+                      <a:pPr algn="l" fontAlgn="ctr"/>
+                      <a:r>
+                        <a:rPr lang="en-US" sz="1100" u="none" strike="noStrike">
+                          <a:effectLst/>
+                        </a:rPr>
+                        <a:t>19.27%</a:t>
+                      </a:r>
+                      <a:endParaRPr lang="en-US" sz="1100" b="0" i="0" u="none" strike="noStrike">
+                        <a:solidFill>
+                          <a:srgbClr val="000000"/>
+                        </a:solidFill>
+                        <a:effectLst/>
+                        <a:latin typeface="Arial" panose="020B0604020202020204" pitchFamily="34" charset="0"/>
+                      </a:endParaRPr>
+                    </a:p>
+                  </a:txBody>
+                  <a:tcPr marL="171450" marR="9525" marT="9525" marB="0" anchor="ctr"/>
+                </a:tc>
+                <a:tc>
+                  <a:txBody>
+                    <a:bodyPr/>
+                    <a:lstStyle/>
+                    <a:p>
+                      <a:pPr algn="l" fontAlgn="ctr"/>
+                      <a:r>
+                        <a:rPr lang="en-US" sz="1100" u="none" strike="noStrike">
+                          <a:effectLst/>
+                        </a:rPr>
+                        <a:t>74.08%</a:t>
+                      </a:r>
+                      <a:endParaRPr lang="en-US" sz="1100" b="0" i="0" u="none" strike="noStrike">
+                        <a:solidFill>
+                          <a:srgbClr val="000000"/>
+                        </a:solidFill>
+                        <a:effectLst/>
+                        <a:latin typeface="Arial" panose="020B0604020202020204" pitchFamily="34" charset="0"/>
+                      </a:endParaRPr>
+                    </a:p>
+                  </a:txBody>
+                  <a:tcPr marL="171450" marR="9525" marT="9525" marB="0" anchor="ctr"/>
+                </a:tc>
+                <a:tc>
+                  <a:txBody>
+                    <a:bodyPr/>
+                    <a:lstStyle/>
+                    <a:p>
+                      <a:pPr algn="l" fontAlgn="ctr"/>
+                      <a:r>
+                        <a:rPr lang="en-US" sz="1100" u="none" strike="noStrike">
+                          <a:effectLst/>
+                        </a:rPr>
+                        <a:t>70.26%</a:t>
+                      </a:r>
+                      <a:endParaRPr lang="en-US" sz="1100" b="0" i="0" u="none" strike="noStrike">
+                        <a:solidFill>
+                          <a:srgbClr val="000000"/>
+                        </a:solidFill>
+                        <a:effectLst/>
+                        <a:latin typeface="Arial" panose="020B0604020202020204" pitchFamily="34" charset="0"/>
+                      </a:endParaRPr>
+                    </a:p>
+                  </a:txBody>
+                  <a:tcPr marL="171450" marR="9525" marT="9525" marB="0" anchor="ctr"/>
+                </a:tc>
+                <a:tc>
+                  <a:txBody>
+                    <a:bodyPr/>
+                    <a:lstStyle/>
+                    <a:p>
+                      <a:pPr algn="l" fontAlgn="ctr"/>
+                      <a:r>
+                        <a:rPr lang="en-US" sz="1100" u="none" strike="noStrike">
+                          <a:effectLst/>
+                        </a:rPr>
+                        <a:t>55.46%</a:t>
+                      </a:r>
+                      <a:endParaRPr lang="en-US" sz="1100" b="0" i="0" u="none" strike="noStrike">
+                        <a:solidFill>
+                          <a:srgbClr val="000000"/>
+                        </a:solidFill>
+                        <a:effectLst/>
+                        <a:latin typeface="Arial" panose="020B0604020202020204" pitchFamily="34" charset="0"/>
+                      </a:endParaRPr>
+                    </a:p>
+                  </a:txBody>
+                  <a:tcPr marL="171450" marR="9525" marT="9525" marB="0" anchor="ctr"/>
+                </a:tc>
+                <a:tc>
+                  <a:txBody>
+                    <a:bodyPr/>
+                    <a:lstStyle/>
+                    <a:p>
+                      <a:pPr algn="l" fontAlgn="ctr"/>
+                      <a:r>
+                        <a:rPr lang="en-US" sz="1100" u="none" strike="noStrike">
+                          <a:effectLst/>
+                        </a:rPr>
+                        <a:t>40.23%</a:t>
+                      </a:r>
+                      <a:endParaRPr lang="en-US" sz="1100" b="0" i="0" u="none" strike="noStrike">
+                        <a:solidFill>
+                          <a:srgbClr val="000000"/>
+                        </a:solidFill>
+                        <a:effectLst/>
+                        <a:latin typeface="Arial" panose="020B0604020202020204" pitchFamily="34" charset="0"/>
+                      </a:endParaRPr>
+                    </a:p>
+                  </a:txBody>
+                  <a:tcPr marL="171450" marR="9525" marT="9525" marB="0" anchor="ctr"/>
+                </a:tc>
+                <a:tc>
+                  <a:txBody>
+                    <a:bodyPr/>
+                    <a:lstStyle/>
+                    <a:p>
+                      <a:pPr algn="l" fontAlgn="ctr"/>
+                      <a:r>
+                        <a:rPr lang="en-US" sz="1100" u="none" strike="noStrike">
+                          <a:effectLst/>
+                        </a:rPr>
+                        <a:t>26.76%</a:t>
+                      </a:r>
+                      <a:endParaRPr lang="en-US" sz="1100" b="0" i="0" u="none" strike="noStrike">
+                        <a:solidFill>
+                          <a:srgbClr val="000000"/>
+                        </a:solidFill>
+                        <a:effectLst/>
+                        <a:latin typeface="Arial" panose="020B0604020202020204" pitchFamily="34" charset="0"/>
+                      </a:endParaRPr>
+                    </a:p>
+                  </a:txBody>
+                  <a:tcPr marL="171450" marR="9525" marT="9525" marB="0" anchor="ctr"/>
+                </a:tc>
+                <a:extLst>
+                  <a:ext uri="{0D108BD9-81ED-4DB2-BD59-A6C34878D82A}">
+                    <a16:rowId xmlns:a16="http://schemas.microsoft.com/office/drawing/2014/main" val="3740422733"/>
+                  </a:ext>
+                </a:extLst>
+              </a:tr>
+              <a:tr h="200025">
+                <a:tc>
+                  <a:txBody>
+                    <a:bodyPr/>
+                    <a:lstStyle/>
+                    <a:p>
+                      <a:pPr algn="l" fontAlgn="ctr"/>
+                      <a:r>
+                        <a:rPr lang="en-US" sz="1100" u="none" strike="noStrike">
+                          <a:effectLst/>
+                        </a:rPr>
+                        <a:t>Germany</a:t>
+                      </a:r>
+                      <a:endParaRPr lang="en-US" sz="1100" b="1" i="0" u="none" strike="noStrike">
+                        <a:solidFill>
+                          <a:srgbClr val="000000"/>
+                        </a:solidFill>
+                        <a:effectLst/>
+                        <a:latin typeface="Arial" panose="020B0604020202020204" pitchFamily="34" charset="0"/>
+                      </a:endParaRPr>
+                    </a:p>
+                  </a:txBody>
+                  <a:tcPr marL="171450" marR="9525" marT="9525" marB="0" anchor="ctr"/>
+                </a:tc>
+                <a:tc>
+                  <a:txBody>
+                    <a:bodyPr/>
+                    <a:lstStyle/>
+                    <a:p>
+                      <a:pPr algn="l" fontAlgn="ctr"/>
+                      <a:r>
+                        <a:rPr lang="en-US" sz="1100" u="none" strike="noStrike">
+                          <a:effectLst/>
+                        </a:rPr>
+                        <a:t>20.73%</a:t>
+                      </a:r>
+                      <a:endParaRPr lang="en-US" sz="1100" b="0" i="0" u="none" strike="noStrike">
+                        <a:solidFill>
+                          <a:srgbClr val="000000"/>
+                        </a:solidFill>
+                        <a:effectLst/>
+                        <a:latin typeface="Arial" panose="020B0604020202020204" pitchFamily="34" charset="0"/>
+                      </a:endParaRPr>
+                    </a:p>
+                  </a:txBody>
+                  <a:tcPr marL="171450" marR="9525" marT="9525" marB="0" anchor="ctr"/>
+                </a:tc>
+                <a:tc>
+                  <a:txBody>
+                    <a:bodyPr/>
+                    <a:lstStyle/>
+                    <a:p>
+                      <a:pPr algn="l" fontAlgn="ctr"/>
+                      <a:r>
+                        <a:rPr lang="en-US" sz="1100" u="none" strike="noStrike">
+                          <a:effectLst/>
+                        </a:rPr>
+                        <a:t>69.95%</a:t>
+                      </a:r>
+                      <a:endParaRPr lang="en-US" sz="1100" b="0" i="0" u="none" strike="noStrike">
+                        <a:solidFill>
+                          <a:srgbClr val="000000"/>
+                        </a:solidFill>
+                        <a:effectLst/>
+                        <a:latin typeface="Arial" panose="020B0604020202020204" pitchFamily="34" charset="0"/>
+                      </a:endParaRPr>
+                    </a:p>
+                  </a:txBody>
+                  <a:tcPr marL="171450" marR="9525" marT="9525" marB="0" anchor="ctr"/>
+                </a:tc>
+                <a:tc>
+                  <a:txBody>
+                    <a:bodyPr/>
+                    <a:lstStyle/>
+                    <a:p>
+                      <a:pPr algn="l" fontAlgn="ctr"/>
+                      <a:r>
+                        <a:rPr lang="en-US" sz="1100" u="none" strike="noStrike">
+                          <a:effectLst/>
+                        </a:rPr>
+                        <a:t>64.20%</a:t>
+                      </a:r>
+                      <a:endParaRPr lang="en-US" sz="1100" b="0" i="0" u="none" strike="noStrike">
+                        <a:solidFill>
+                          <a:srgbClr val="000000"/>
+                        </a:solidFill>
+                        <a:effectLst/>
+                        <a:latin typeface="Arial" panose="020B0604020202020204" pitchFamily="34" charset="0"/>
+                      </a:endParaRPr>
+                    </a:p>
+                  </a:txBody>
+                  <a:tcPr marL="171450" marR="9525" marT="9525" marB="0" anchor="ctr"/>
+                </a:tc>
+                <a:tc>
+                  <a:txBody>
+                    <a:bodyPr/>
+                    <a:lstStyle/>
+                    <a:p>
+                      <a:pPr algn="l" fontAlgn="ctr"/>
+                      <a:r>
+                        <a:rPr lang="en-US" sz="1100" u="none" strike="noStrike">
+                          <a:effectLst/>
+                        </a:rPr>
+                        <a:t>48.17%</a:t>
+                      </a:r>
+                      <a:endParaRPr lang="en-US" sz="1100" b="0" i="0" u="none" strike="noStrike">
+                        <a:solidFill>
+                          <a:srgbClr val="000000"/>
+                        </a:solidFill>
+                        <a:effectLst/>
+                        <a:latin typeface="Arial" panose="020B0604020202020204" pitchFamily="34" charset="0"/>
+                      </a:endParaRPr>
+                    </a:p>
+                  </a:txBody>
+                  <a:tcPr marL="171450" marR="9525" marT="9525" marB="0" anchor="ctr"/>
+                </a:tc>
+                <a:tc>
+                  <a:txBody>
+                    <a:bodyPr/>
+                    <a:lstStyle/>
+                    <a:p>
+                      <a:pPr algn="l" fontAlgn="ctr"/>
+                      <a:r>
+                        <a:rPr lang="en-US" sz="1100" u="none" strike="noStrike">
+                          <a:effectLst/>
+                        </a:rPr>
+                        <a:t>32.34%</a:t>
+                      </a:r>
+                      <a:endParaRPr lang="en-US" sz="1100" b="0" i="0" u="none" strike="noStrike">
+                        <a:solidFill>
+                          <a:srgbClr val="000000"/>
+                        </a:solidFill>
+                        <a:effectLst/>
+                        <a:latin typeface="Arial" panose="020B0604020202020204" pitchFamily="34" charset="0"/>
+                      </a:endParaRPr>
+                    </a:p>
+                  </a:txBody>
+                  <a:tcPr marL="171450" marR="9525" marT="9525" marB="0" anchor="ctr"/>
+                </a:tc>
+                <a:tc>
+                  <a:txBody>
+                    <a:bodyPr/>
+                    <a:lstStyle/>
+                    <a:p>
+                      <a:pPr algn="l" fontAlgn="ctr"/>
+                      <a:r>
+                        <a:rPr lang="en-US" sz="1100" u="none" strike="noStrike">
+                          <a:effectLst/>
+                        </a:rPr>
+                        <a:t>19.51%</a:t>
+                      </a:r>
+                      <a:endParaRPr lang="en-US" sz="1100" b="0" i="0" u="none" strike="noStrike">
+                        <a:solidFill>
+                          <a:srgbClr val="000000"/>
+                        </a:solidFill>
+                        <a:effectLst/>
+                        <a:latin typeface="Arial" panose="020B0604020202020204" pitchFamily="34" charset="0"/>
+                      </a:endParaRPr>
+                    </a:p>
+                  </a:txBody>
+                  <a:tcPr marL="171450" marR="9525" marT="9525" marB="0" anchor="ctr"/>
+                </a:tc>
+                <a:extLst>
+                  <a:ext uri="{0D108BD9-81ED-4DB2-BD59-A6C34878D82A}">
+                    <a16:rowId xmlns:a16="http://schemas.microsoft.com/office/drawing/2014/main" val="1780199347"/>
+                  </a:ext>
+                </a:extLst>
+              </a:tr>
+              <a:tr h="200025">
+                <a:tc>
+                  <a:txBody>
+                    <a:bodyPr/>
+                    <a:lstStyle/>
+                    <a:p>
+                      <a:pPr algn="l" fontAlgn="ctr"/>
+                      <a:r>
+                        <a:rPr lang="en-US" sz="1100" u="none" strike="noStrike">
+                          <a:effectLst/>
+                        </a:rPr>
+                        <a:t>Spain</a:t>
+                      </a:r>
+                      <a:endParaRPr lang="en-US" sz="1100" b="1" i="0" u="none" strike="noStrike">
+                        <a:solidFill>
+                          <a:srgbClr val="000000"/>
+                        </a:solidFill>
+                        <a:effectLst/>
+                        <a:latin typeface="Arial" panose="020B0604020202020204" pitchFamily="34" charset="0"/>
+                      </a:endParaRPr>
+                    </a:p>
+                  </a:txBody>
+                  <a:tcPr marL="171450" marR="9525" marT="9525" marB="0" anchor="ctr"/>
+                </a:tc>
+                <a:tc>
+                  <a:txBody>
+                    <a:bodyPr/>
+                    <a:lstStyle/>
+                    <a:p>
+                      <a:pPr algn="l" fontAlgn="ctr"/>
+                      <a:r>
+                        <a:rPr lang="en-US" sz="1100" u="none" strike="noStrike">
+                          <a:effectLst/>
+                        </a:rPr>
+                        <a:t>31.02%</a:t>
+                      </a:r>
+                      <a:endParaRPr lang="en-US" sz="1100" b="0" i="0" u="none" strike="noStrike">
+                        <a:solidFill>
+                          <a:srgbClr val="000000"/>
+                        </a:solidFill>
+                        <a:effectLst/>
+                        <a:latin typeface="Arial" panose="020B0604020202020204" pitchFamily="34" charset="0"/>
+                      </a:endParaRPr>
+                    </a:p>
+                  </a:txBody>
+                  <a:tcPr marL="171450" marR="9525" marT="9525" marB="0" anchor="ctr"/>
+                </a:tc>
+                <a:tc>
+                  <a:txBody>
+                    <a:bodyPr/>
+                    <a:lstStyle/>
+                    <a:p>
+                      <a:pPr algn="l" fontAlgn="ctr"/>
+                      <a:r>
+                        <a:rPr lang="en-US" sz="1100" u="none" strike="noStrike">
+                          <a:effectLst/>
+                        </a:rPr>
+                        <a:t>53.95%</a:t>
+                      </a:r>
+                      <a:endParaRPr lang="en-US" sz="1100" b="0" i="0" u="none" strike="noStrike">
+                        <a:solidFill>
+                          <a:srgbClr val="000000"/>
+                        </a:solidFill>
+                        <a:effectLst/>
+                        <a:latin typeface="Arial" panose="020B0604020202020204" pitchFamily="34" charset="0"/>
+                      </a:endParaRPr>
+                    </a:p>
+                  </a:txBody>
+                  <a:tcPr marL="171450" marR="9525" marT="9525" marB="0" anchor="ctr"/>
+                </a:tc>
+                <a:tc>
+                  <a:txBody>
+                    <a:bodyPr/>
+                    <a:lstStyle/>
+                    <a:p>
+                      <a:pPr algn="l" fontAlgn="ctr"/>
+                      <a:r>
+                        <a:rPr lang="en-US" sz="1100" u="none" strike="noStrike">
+                          <a:effectLst/>
+                        </a:rPr>
+                        <a:t>70.75%</a:t>
+                      </a:r>
+                      <a:endParaRPr lang="en-US" sz="1100" b="0" i="0" u="none" strike="noStrike">
+                        <a:solidFill>
+                          <a:srgbClr val="000000"/>
+                        </a:solidFill>
+                        <a:effectLst/>
+                        <a:latin typeface="Arial" panose="020B0604020202020204" pitchFamily="34" charset="0"/>
+                      </a:endParaRPr>
+                    </a:p>
+                  </a:txBody>
+                  <a:tcPr marL="171450" marR="9525" marT="9525" marB="0" anchor="ctr"/>
+                </a:tc>
+                <a:tc>
+                  <a:txBody>
+                    <a:bodyPr/>
+                    <a:lstStyle/>
+                    <a:p>
+                      <a:pPr algn="l" fontAlgn="ctr"/>
+                      <a:r>
+                        <a:rPr lang="en-US" sz="1100" u="none" strike="noStrike">
+                          <a:effectLst/>
+                        </a:rPr>
+                        <a:t>47.27%</a:t>
+                      </a:r>
+                      <a:endParaRPr lang="en-US" sz="1100" b="0" i="0" u="none" strike="noStrike">
+                        <a:solidFill>
+                          <a:srgbClr val="000000"/>
+                        </a:solidFill>
+                        <a:effectLst/>
+                        <a:latin typeface="Arial" panose="020B0604020202020204" pitchFamily="34" charset="0"/>
+                      </a:endParaRPr>
+                    </a:p>
+                  </a:txBody>
+                  <a:tcPr marL="171450" marR="9525" marT="9525" marB="0" anchor="ctr"/>
+                </a:tc>
+                <a:tc>
+                  <a:txBody>
+                    <a:bodyPr/>
+                    <a:lstStyle/>
+                    <a:p>
+                      <a:pPr algn="l" fontAlgn="ctr"/>
+                      <a:r>
+                        <a:rPr lang="en-US" sz="1100" u="none" strike="noStrike">
+                          <a:effectLst/>
+                        </a:rPr>
+                        <a:t>26.63%</a:t>
+                      </a:r>
+                      <a:endParaRPr lang="en-US" sz="1100" b="0" i="0" u="none" strike="noStrike">
+                        <a:solidFill>
+                          <a:srgbClr val="000000"/>
+                        </a:solidFill>
+                        <a:effectLst/>
+                        <a:latin typeface="Arial" panose="020B0604020202020204" pitchFamily="34" charset="0"/>
+                      </a:endParaRPr>
+                    </a:p>
+                  </a:txBody>
+                  <a:tcPr marL="171450" marR="9525" marT="9525" marB="0" anchor="ctr"/>
+                </a:tc>
+                <a:tc>
+                  <a:txBody>
+                    <a:bodyPr/>
+                    <a:lstStyle/>
+                    <a:p>
+                      <a:pPr algn="l" fontAlgn="ctr"/>
+                      <a:r>
+                        <a:rPr lang="en-US" sz="1100" u="none" strike="noStrike">
+                          <a:effectLst/>
+                        </a:rPr>
+                        <a:t>14.68%</a:t>
+                      </a:r>
+                      <a:endParaRPr lang="en-US" sz="1100" b="0" i="0" u="none" strike="noStrike">
+                        <a:solidFill>
+                          <a:srgbClr val="000000"/>
+                        </a:solidFill>
+                        <a:effectLst/>
+                        <a:latin typeface="Arial" panose="020B0604020202020204" pitchFamily="34" charset="0"/>
+                      </a:endParaRPr>
+                    </a:p>
+                  </a:txBody>
+                  <a:tcPr marL="171450" marR="9525" marT="9525" marB="0" anchor="ctr"/>
+                </a:tc>
+                <a:extLst>
+                  <a:ext uri="{0D108BD9-81ED-4DB2-BD59-A6C34878D82A}">
+                    <a16:rowId xmlns:a16="http://schemas.microsoft.com/office/drawing/2014/main" val="1658057676"/>
+                  </a:ext>
+                </a:extLst>
+              </a:tr>
+              <a:tr h="200025">
+                <a:tc>
+                  <a:txBody>
+                    <a:bodyPr/>
+                    <a:lstStyle/>
+                    <a:p>
+                      <a:pPr algn="l" fontAlgn="ctr"/>
+                      <a:r>
+                        <a:rPr lang="en-US" sz="1100" u="none" strike="noStrike">
+                          <a:effectLst/>
+                        </a:rPr>
+                        <a:t>Portugal</a:t>
+                      </a:r>
+                      <a:endParaRPr lang="en-US" sz="1100" b="1" i="0" u="none" strike="noStrike">
+                        <a:solidFill>
+                          <a:srgbClr val="000000"/>
+                        </a:solidFill>
+                        <a:effectLst/>
+                        <a:latin typeface="Arial" panose="020B0604020202020204" pitchFamily="34" charset="0"/>
+                      </a:endParaRPr>
+                    </a:p>
+                  </a:txBody>
+                  <a:tcPr marL="171450" marR="9525" marT="9525" marB="0" anchor="ctr"/>
+                </a:tc>
+                <a:tc>
+                  <a:txBody>
+                    <a:bodyPr/>
+                    <a:lstStyle/>
+                    <a:p>
+                      <a:pPr algn="l" fontAlgn="ctr"/>
+                      <a:r>
+                        <a:rPr lang="en-US" sz="1100" u="none" strike="noStrike">
+                          <a:effectLst/>
+                        </a:rPr>
+                        <a:t>39.84%</a:t>
+                      </a:r>
+                      <a:endParaRPr lang="en-US" sz="1100" b="0" i="0" u="none" strike="noStrike">
+                        <a:solidFill>
+                          <a:srgbClr val="000000"/>
+                        </a:solidFill>
+                        <a:effectLst/>
+                        <a:latin typeface="Arial" panose="020B0604020202020204" pitchFamily="34" charset="0"/>
+                      </a:endParaRPr>
+                    </a:p>
+                  </a:txBody>
+                  <a:tcPr marL="171450" marR="9525" marT="9525" marB="0" anchor="ctr"/>
+                </a:tc>
+                <a:tc>
+                  <a:txBody>
+                    <a:bodyPr/>
+                    <a:lstStyle/>
+                    <a:p>
+                      <a:pPr algn="l" fontAlgn="ctr"/>
+                      <a:r>
+                        <a:rPr lang="en-US" sz="1100" u="none" strike="noStrike">
+                          <a:effectLst/>
+                        </a:rPr>
+                        <a:t>33.41%</a:t>
+                      </a:r>
+                      <a:endParaRPr lang="en-US" sz="1100" b="0" i="0" u="none" strike="noStrike">
+                        <a:solidFill>
+                          <a:srgbClr val="000000"/>
+                        </a:solidFill>
+                        <a:effectLst/>
+                        <a:latin typeface="Arial" panose="020B0604020202020204" pitchFamily="34" charset="0"/>
+                      </a:endParaRPr>
+                    </a:p>
+                  </a:txBody>
+                  <a:tcPr marL="171450" marR="9525" marT="9525" marB="0" anchor="ctr"/>
+                </a:tc>
+                <a:tc>
+                  <a:txBody>
+                    <a:bodyPr/>
+                    <a:lstStyle/>
+                    <a:p>
+                      <a:pPr algn="l" fontAlgn="ctr"/>
+                      <a:r>
+                        <a:rPr lang="en-US" sz="1100" u="none" strike="noStrike">
+                          <a:effectLst/>
+                        </a:rPr>
+                        <a:t>55.03%</a:t>
+                      </a:r>
+                      <a:endParaRPr lang="en-US" sz="1100" b="0" i="0" u="none" strike="noStrike">
+                        <a:solidFill>
+                          <a:srgbClr val="000000"/>
+                        </a:solidFill>
+                        <a:effectLst/>
+                        <a:latin typeface="Arial" panose="020B0604020202020204" pitchFamily="34" charset="0"/>
+                      </a:endParaRPr>
+                    </a:p>
+                  </a:txBody>
+                  <a:tcPr marL="171450" marR="9525" marT="9525" marB="0" anchor="ctr"/>
+                </a:tc>
+                <a:tc>
+                  <a:txBody>
+                    <a:bodyPr/>
+                    <a:lstStyle/>
+                    <a:p>
+                      <a:pPr algn="l" fontAlgn="ctr"/>
+                      <a:r>
+                        <a:rPr lang="en-US" sz="1100" u="none" strike="noStrike">
+                          <a:effectLst/>
+                        </a:rPr>
+                        <a:t>32.17%</a:t>
+                      </a:r>
+                      <a:endParaRPr lang="en-US" sz="1100" b="0" i="0" u="none" strike="noStrike">
+                        <a:solidFill>
+                          <a:srgbClr val="000000"/>
+                        </a:solidFill>
+                        <a:effectLst/>
+                        <a:latin typeface="Arial" panose="020B0604020202020204" pitchFamily="34" charset="0"/>
+                      </a:endParaRPr>
+                    </a:p>
+                  </a:txBody>
+                  <a:tcPr marL="171450" marR="9525" marT="9525" marB="0" anchor="ctr"/>
+                </a:tc>
+                <a:tc>
+                  <a:txBody>
+                    <a:bodyPr/>
+                    <a:lstStyle/>
+                    <a:p>
+                      <a:pPr algn="l" fontAlgn="ctr"/>
+                      <a:r>
+                        <a:rPr lang="en-US" sz="1100" u="none" strike="noStrike">
+                          <a:effectLst/>
+                        </a:rPr>
+                        <a:t>14.27%</a:t>
+                      </a:r>
+                      <a:endParaRPr lang="en-US" sz="1100" b="0" i="0" u="none" strike="noStrike">
+                        <a:solidFill>
+                          <a:srgbClr val="000000"/>
+                        </a:solidFill>
+                        <a:effectLst/>
+                        <a:latin typeface="Arial" panose="020B0604020202020204" pitchFamily="34" charset="0"/>
+                      </a:endParaRPr>
+                    </a:p>
+                  </a:txBody>
+                  <a:tcPr marL="171450" marR="9525" marT="9525" marB="0" anchor="ctr"/>
+                </a:tc>
+                <a:tc>
+                  <a:txBody>
+                    <a:bodyPr/>
+                    <a:lstStyle/>
+                    <a:p>
+                      <a:pPr algn="l" fontAlgn="ctr"/>
+                      <a:r>
+                        <a:rPr lang="en-US" sz="1100" u="none" strike="noStrike">
+                          <a:effectLst/>
+                        </a:rPr>
+                        <a:t>6.48%</a:t>
+                      </a:r>
+                      <a:endParaRPr lang="en-US" sz="1100" b="0" i="0" u="none" strike="noStrike">
+                        <a:solidFill>
+                          <a:srgbClr val="000000"/>
+                        </a:solidFill>
+                        <a:effectLst/>
+                        <a:latin typeface="Arial" panose="020B0604020202020204" pitchFamily="34" charset="0"/>
+                      </a:endParaRPr>
+                    </a:p>
+                  </a:txBody>
+                  <a:tcPr marL="171450" marR="9525" marT="9525" marB="0" anchor="ctr"/>
+                </a:tc>
+                <a:extLst>
+                  <a:ext uri="{0D108BD9-81ED-4DB2-BD59-A6C34878D82A}">
+                    <a16:rowId xmlns:a16="http://schemas.microsoft.com/office/drawing/2014/main" val="1242287260"/>
+                  </a:ext>
+                </a:extLst>
+              </a:tr>
+              <a:tr h="200025">
+                <a:tc>
+                  <a:txBody>
+                    <a:bodyPr/>
+                    <a:lstStyle/>
+                    <a:p>
+                      <a:pPr algn="l" fontAlgn="ctr"/>
+                      <a:r>
+                        <a:rPr lang="en-US" sz="1100" u="none" strike="noStrike">
+                          <a:effectLst/>
+                        </a:rPr>
+                        <a:t>Argentina</a:t>
+                      </a:r>
+                      <a:endParaRPr lang="en-US" sz="1100" b="1" i="0" u="none" strike="noStrike">
+                        <a:solidFill>
+                          <a:srgbClr val="000000"/>
+                        </a:solidFill>
+                        <a:effectLst/>
+                        <a:latin typeface="Arial" panose="020B0604020202020204" pitchFamily="34" charset="0"/>
+                      </a:endParaRPr>
+                    </a:p>
+                  </a:txBody>
+                  <a:tcPr marL="171450" marR="9525" marT="9525" marB="0" anchor="ctr"/>
+                </a:tc>
+                <a:tc>
+                  <a:txBody>
+                    <a:bodyPr/>
+                    <a:lstStyle/>
+                    <a:p>
+                      <a:pPr algn="l" fontAlgn="ctr"/>
+                      <a:r>
+                        <a:rPr lang="en-US" sz="1100" u="none" strike="noStrike">
+                          <a:effectLst/>
+                        </a:rPr>
+                        <a:t>26.52%</a:t>
+                      </a:r>
+                      <a:endParaRPr lang="en-US" sz="1100" b="0" i="0" u="none" strike="noStrike">
+                        <a:solidFill>
+                          <a:srgbClr val="000000"/>
+                        </a:solidFill>
+                        <a:effectLst/>
+                        <a:latin typeface="Arial" panose="020B0604020202020204" pitchFamily="34" charset="0"/>
+                      </a:endParaRPr>
+                    </a:p>
+                  </a:txBody>
+                  <a:tcPr marL="171450" marR="9525" marT="9525" marB="0" anchor="ctr"/>
+                </a:tc>
+                <a:tc>
+                  <a:txBody>
+                    <a:bodyPr/>
+                    <a:lstStyle/>
+                    <a:p>
+                      <a:pPr algn="l" fontAlgn="ctr"/>
+                      <a:r>
+                        <a:rPr lang="en-US" sz="1100" u="none" strike="noStrike">
+                          <a:effectLst/>
+                        </a:rPr>
+                        <a:t>56.39%</a:t>
+                      </a:r>
+                      <a:endParaRPr lang="en-US" sz="1100" b="0" i="0" u="none" strike="noStrike">
+                        <a:solidFill>
+                          <a:srgbClr val="000000"/>
+                        </a:solidFill>
+                        <a:effectLst/>
+                        <a:latin typeface="Arial" panose="020B0604020202020204" pitchFamily="34" charset="0"/>
+                      </a:endParaRPr>
+                    </a:p>
+                  </a:txBody>
+                  <a:tcPr marL="171450" marR="9525" marT="9525" marB="0" anchor="ctr"/>
+                </a:tc>
+                <a:tc>
+                  <a:txBody>
+                    <a:bodyPr/>
+                    <a:lstStyle/>
+                    <a:p>
+                      <a:pPr algn="l" fontAlgn="ctr"/>
+                      <a:r>
+                        <a:rPr lang="en-US" sz="1100" u="none" strike="noStrike">
+                          <a:effectLst/>
+                        </a:rPr>
+                        <a:t>50.52%</a:t>
+                      </a:r>
+                      <a:endParaRPr lang="en-US" sz="1100" b="0" i="0" u="none" strike="noStrike">
+                        <a:solidFill>
+                          <a:srgbClr val="000000"/>
+                        </a:solidFill>
+                        <a:effectLst/>
+                        <a:latin typeface="Arial" panose="020B0604020202020204" pitchFamily="34" charset="0"/>
+                      </a:endParaRPr>
+                    </a:p>
+                  </a:txBody>
+                  <a:tcPr marL="171450" marR="9525" marT="9525" marB="0" anchor="ctr"/>
+                </a:tc>
+                <a:tc>
+                  <a:txBody>
+                    <a:bodyPr/>
+                    <a:lstStyle/>
+                    <a:p>
+                      <a:pPr algn="l" fontAlgn="ctr"/>
+                      <a:r>
+                        <a:rPr lang="en-US" sz="1100" u="none" strike="noStrike">
+                          <a:effectLst/>
+                        </a:rPr>
+                        <a:t>27.52%</a:t>
+                      </a:r>
+                      <a:endParaRPr lang="en-US" sz="1100" b="0" i="0" u="none" strike="noStrike">
+                        <a:solidFill>
+                          <a:srgbClr val="000000"/>
+                        </a:solidFill>
+                        <a:effectLst/>
+                        <a:latin typeface="Arial" panose="020B0604020202020204" pitchFamily="34" charset="0"/>
+                      </a:endParaRPr>
+                    </a:p>
+                  </a:txBody>
+                  <a:tcPr marL="171450" marR="9525" marT="9525" marB="0" anchor="ctr"/>
+                </a:tc>
+                <a:tc>
+                  <a:txBody>
+                    <a:bodyPr/>
+                    <a:lstStyle/>
+                    <a:p>
+                      <a:pPr algn="l" fontAlgn="ctr"/>
+                      <a:r>
+                        <a:rPr lang="en-US" sz="1100" u="none" strike="noStrike">
+                          <a:effectLst/>
+                        </a:rPr>
+                        <a:t>13.17%</a:t>
+                      </a:r>
+                      <a:endParaRPr lang="en-US" sz="1100" b="0" i="0" u="none" strike="noStrike">
+                        <a:solidFill>
+                          <a:srgbClr val="000000"/>
+                        </a:solidFill>
+                        <a:effectLst/>
+                        <a:latin typeface="Arial" panose="020B0604020202020204" pitchFamily="34" charset="0"/>
+                      </a:endParaRPr>
+                    </a:p>
+                  </a:txBody>
+                  <a:tcPr marL="171450" marR="9525" marT="9525" marB="0" anchor="ctr"/>
+                </a:tc>
+                <a:tc>
+                  <a:txBody>
+                    <a:bodyPr/>
+                    <a:lstStyle/>
+                    <a:p>
+                      <a:pPr algn="l" fontAlgn="ctr"/>
+                      <a:r>
+                        <a:rPr lang="en-US" sz="1100" u="none" strike="noStrike">
+                          <a:effectLst/>
+                        </a:rPr>
+                        <a:t>6.27%</a:t>
+                      </a:r>
+                      <a:endParaRPr lang="en-US" sz="1100" b="0" i="0" u="none" strike="noStrike">
+                        <a:solidFill>
+                          <a:srgbClr val="000000"/>
+                        </a:solidFill>
+                        <a:effectLst/>
+                        <a:latin typeface="Arial" panose="020B0604020202020204" pitchFamily="34" charset="0"/>
+                      </a:endParaRPr>
+                    </a:p>
+                  </a:txBody>
+                  <a:tcPr marL="171450" marR="9525" marT="9525" marB="0" anchor="ctr"/>
+                </a:tc>
+                <a:extLst>
+                  <a:ext uri="{0D108BD9-81ED-4DB2-BD59-A6C34878D82A}">
+                    <a16:rowId xmlns:a16="http://schemas.microsoft.com/office/drawing/2014/main" val="3935548800"/>
+                  </a:ext>
+                </a:extLst>
+              </a:tr>
+              <a:tr h="200025">
+                <a:tc>
+                  <a:txBody>
+                    <a:bodyPr/>
+                    <a:lstStyle/>
+                    <a:p>
+                      <a:pPr algn="l" fontAlgn="ctr"/>
+                      <a:r>
+                        <a:rPr lang="en-US" sz="1100" u="none" strike="noStrike">
+                          <a:effectLst/>
+                        </a:rPr>
+                        <a:t>France</a:t>
+                      </a:r>
+                      <a:endParaRPr lang="en-US" sz="1100" b="1" i="0" u="none" strike="noStrike">
+                        <a:solidFill>
+                          <a:srgbClr val="000000"/>
+                        </a:solidFill>
+                        <a:effectLst/>
+                        <a:latin typeface="Arial" panose="020B0604020202020204" pitchFamily="34" charset="0"/>
+                      </a:endParaRPr>
+                    </a:p>
+                  </a:txBody>
+                  <a:tcPr marL="171450" marR="9525" marT="9525" marB="0" anchor="ctr"/>
+                </a:tc>
+                <a:tc>
+                  <a:txBody>
+                    <a:bodyPr/>
+                    <a:lstStyle/>
+                    <a:p>
+                      <a:pPr algn="l" fontAlgn="ctr"/>
+                      <a:r>
+                        <a:rPr lang="en-US" sz="1100" u="none" strike="noStrike">
+                          <a:effectLst/>
+                        </a:rPr>
+                        <a:t>29.67%</a:t>
+                      </a:r>
+                      <a:endParaRPr lang="en-US" sz="1100" b="0" i="0" u="none" strike="noStrike">
+                        <a:solidFill>
+                          <a:srgbClr val="000000"/>
+                        </a:solidFill>
+                        <a:effectLst/>
+                        <a:latin typeface="Arial" panose="020B0604020202020204" pitchFamily="34" charset="0"/>
+                      </a:endParaRPr>
+                    </a:p>
+                  </a:txBody>
+                  <a:tcPr marL="171450" marR="9525" marT="9525" marB="0" anchor="ctr"/>
+                </a:tc>
+                <a:tc>
+                  <a:txBody>
+                    <a:bodyPr/>
+                    <a:lstStyle/>
+                    <a:p>
+                      <a:pPr algn="l" fontAlgn="ctr"/>
+                      <a:r>
+                        <a:rPr lang="en-US" sz="1100" u="none" strike="noStrike">
+                          <a:effectLst/>
+                        </a:rPr>
+                        <a:t>48.51%</a:t>
+                      </a:r>
+                      <a:endParaRPr lang="en-US" sz="1100" b="0" i="0" u="none" strike="noStrike">
+                        <a:solidFill>
+                          <a:srgbClr val="000000"/>
+                        </a:solidFill>
+                        <a:effectLst/>
+                        <a:latin typeface="Arial" panose="020B0604020202020204" pitchFamily="34" charset="0"/>
+                      </a:endParaRPr>
+                    </a:p>
+                  </a:txBody>
+                  <a:tcPr marL="171450" marR="9525" marT="9525" marB="0" anchor="ctr"/>
+                </a:tc>
+                <a:tc>
+                  <a:txBody>
+                    <a:bodyPr/>
+                    <a:lstStyle/>
+                    <a:p>
+                      <a:pPr algn="l" fontAlgn="ctr"/>
+                      <a:r>
+                        <a:rPr lang="en-US" sz="1100" u="none" strike="noStrike">
+                          <a:effectLst/>
+                        </a:rPr>
+                        <a:t>50.74%</a:t>
+                      </a:r>
+                      <a:endParaRPr lang="en-US" sz="1100" b="0" i="0" u="none" strike="noStrike">
+                        <a:solidFill>
+                          <a:srgbClr val="000000"/>
+                        </a:solidFill>
+                        <a:effectLst/>
+                        <a:latin typeface="Arial" panose="020B0604020202020204" pitchFamily="34" charset="0"/>
+                      </a:endParaRPr>
+                    </a:p>
+                  </a:txBody>
+                  <a:tcPr marL="171450" marR="9525" marT="9525" marB="0" anchor="ctr"/>
+                </a:tc>
+                <a:tc>
+                  <a:txBody>
+                    <a:bodyPr/>
+                    <a:lstStyle/>
+                    <a:p>
+                      <a:pPr algn="l" fontAlgn="ctr"/>
+                      <a:r>
+                        <a:rPr lang="en-US" sz="1100" u="none" strike="noStrike">
+                          <a:effectLst/>
+                        </a:rPr>
+                        <a:t>28.41%</a:t>
+                      </a:r>
+                      <a:endParaRPr lang="en-US" sz="1100" b="0" i="0" u="none" strike="noStrike">
+                        <a:solidFill>
+                          <a:srgbClr val="000000"/>
+                        </a:solidFill>
+                        <a:effectLst/>
+                        <a:latin typeface="Arial" panose="020B0604020202020204" pitchFamily="34" charset="0"/>
+                      </a:endParaRPr>
+                    </a:p>
+                  </a:txBody>
+                  <a:tcPr marL="171450" marR="9525" marT="9525" marB="0" anchor="ctr"/>
+                </a:tc>
+                <a:tc>
+                  <a:txBody>
+                    <a:bodyPr/>
+                    <a:lstStyle/>
+                    <a:p>
+                      <a:pPr algn="l" fontAlgn="ctr"/>
+                      <a:r>
+                        <a:rPr lang="en-US" sz="1100" u="none" strike="noStrike">
+                          <a:effectLst/>
+                        </a:rPr>
+                        <a:t>13.19%</a:t>
+                      </a:r>
+                      <a:endParaRPr lang="en-US" sz="1100" b="0" i="0" u="none" strike="noStrike">
+                        <a:solidFill>
+                          <a:srgbClr val="000000"/>
+                        </a:solidFill>
+                        <a:effectLst/>
+                        <a:latin typeface="Arial" panose="020B0604020202020204" pitchFamily="34" charset="0"/>
+                      </a:endParaRPr>
+                    </a:p>
+                  </a:txBody>
+                  <a:tcPr marL="171450" marR="9525" marT="9525" marB="0" anchor="ctr"/>
+                </a:tc>
+                <a:tc>
+                  <a:txBody>
+                    <a:bodyPr/>
+                    <a:lstStyle/>
+                    <a:p>
+                      <a:pPr algn="l" fontAlgn="ctr"/>
+                      <a:r>
+                        <a:rPr lang="en-US" sz="1100" u="none" strike="noStrike" dirty="0">
+                          <a:effectLst/>
+                        </a:rPr>
+                        <a:t>6.01%</a:t>
+                      </a:r>
+                      <a:endParaRPr lang="en-US" sz="1100" b="0" i="0" u="none" strike="noStrike" dirty="0">
+                        <a:solidFill>
+                          <a:srgbClr val="000000"/>
+                        </a:solidFill>
+                        <a:effectLst/>
+                        <a:latin typeface="Arial" panose="020B0604020202020204" pitchFamily="34" charset="0"/>
+                      </a:endParaRPr>
+                    </a:p>
+                  </a:txBody>
+                  <a:tcPr marL="171450" marR="9525" marT="9525" marB="0" anchor="ctr"/>
+                </a:tc>
+                <a:extLst>
+                  <a:ext uri="{0D108BD9-81ED-4DB2-BD59-A6C34878D82A}">
+                    <a16:rowId xmlns:a16="http://schemas.microsoft.com/office/drawing/2014/main" val="222230762"/>
+                  </a:ext>
+                </a:extLst>
+              </a:tr>
+            </a:tbl>
+          </a:graphicData>
+        </a:graphic>
+      </p:graphicFrame>
     </p:spTree>
     <p:extLst>
       <p:ext uri="{BB962C8B-B14F-4D97-AF65-F5344CB8AC3E}">
@@ -13764,7 +15647,7 @@
 </p:sld>
 </file>
 
-<file path=ppt/slides/slide7.xml><?xml version="1.0" encoding="utf-8"?>
+<file path=ppt/slides/slide9.xml><?xml version="1.0" encoding="utf-8"?>
 <p:sld xmlns:a="http://schemas.openxmlformats.org/drawingml/2006/main" xmlns:r="http://schemas.openxmlformats.org/officeDocument/2006/relationships" xmlns:p="http://schemas.openxmlformats.org/presentationml/2006/main">
   <p:cSld>
     <p:spTree>
@@ -13786,7 +15669,7 @@
           <p:cNvPr id="2" name="Title 1">
             <a:extLst>
               <a:ext uri="{FF2B5EF4-FFF2-40B4-BE49-F238E27FC236}">
-                <a16:creationId xmlns:a16="http://schemas.microsoft.com/office/drawing/2014/main" id="{F5CC6EDB-7FF3-4A9A-AB1D-66E72E2119D2}"/>
+                <a16:creationId xmlns:a16="http://schemas.microsoft.com/office/drawing/2014/main" id="{86135670-70D6-4BFC-A43A-E10B9EF691B8}"/>
               </a:ext>
             </a:extLst>
           </p:cNvPr>
@@ -13803,8 +15686,8 @@
           <a:lstStyle/>
           <a:p>
             <a:r>
-              <a:rPr lang="en-US"/>
-              <a:t>Conclusions</a:t>
+              <a:rPr lang="en-US" dirty="0"/>
+              <a:t>Conclusion</a:t>
             </a:r>
           </a:p>
         </p:txBody>
@@ -13814,7 +15697,7 @@
           <p:cNvPr id="3" name="Content Placeholder 2">
             <a:extLst>
               <a:ext uri="{FF2B5EF4-FFF2-40B4-BE49-F238E27FC236}">
-                <a16:creationId xmlns:a16="http://schemas.microsoft.com/office/drawing/2014/main" id="{2571A3DA-4ED4-47DB-9654-158679604EDC}"/>
+                <a16:creationId xmlns:a16="http://schemas.microsoft.com/office/drawing/2014/main" id="{C3139070-8154-4E7F-91A1-DCBB5F45463F}"/>
               </a:ext>
             </a:extLst>
           </p:cNvPr>
@@ -13830,14 +15713,48 @@
           <a:bodyPr/>
           <a:lstStyle/>
           <a:p>
-            <a:endParaRPr lang="en-US"/>
+            <a:r>
+              <a:rPr lang="en-US" dirty="0"/>
+              <a:t>Germany, Brazil, and Spain have a combined 60% win rate.</a:t>
+            </a:r>
+          </a:p>
+          <a:p>
+            <a:r>
+              <a:rPr lang="en-US" dirty="0"/>
+              <a:t>Elo rating is not enough to predict win rate in a game like soccer.</a:t>
+            </a:r>
+          </a:p>
+          <a:p>
+            <a:r>
+              <a:rPr lang="en-US" dirty="0"/>
+              <a:t>“Rock, paper, scissors” syndrome. </a:t>
+            </a:r>
+          </a:p>
+          <a:p>
+            <a:r>
+              <a:rPr lang="en-US" dirty="0"/>
+              <a:t>Other important factors to take into consideration are:</a:t>
+            </a:r>
+          </a:p>
+          <a:p>
+            <a:pPr lvl="1"/>
+            <a:r>
+              <a:rPr lang="en-US" dirty="0"/>
+              <a:t>Past games played between teams, players involved, goals scored, home vs visiting.</a:t>
+            </a:r>
+          </a:p>
+          <a:p>
+            <a:r>
+              <a:rPr lang="en-US" dirty="0"/>
+              <a:t>This is sport, and upsets DO happen. Many models for the 2014 World Cup gave Brazil as the most likely winner. </a:t>
+            </a:r>
           </a:p>
         </p:txBody>
       </p:sp>
     </p:spTree>
     <p:extLst>
       <p:ext uri="{BB962C8B-B14F-4D97-AF65-F5344CB8AC3E}">
-        <p14:creationId xmlns:p14="http://schemas.microsoft.com/office/powerpoint/2010/main" val="2421739474"/>
+        <p14:creationId xmlns:p14="http://schemas.microsoft.com/office/powerpoint/2010/main" val="2905751130"/>
       </p:ext>
     </p:extLst>
   </p:cSld>

</xml_diff>